<commit_message>
fixed mbo use case
</commit_message>
<xml_diff>
--- a/Design Review/Design-Review.pptx
+++ b/Design Review/Design-Review.pptx
@@ -131,7 +131,7 @@
   </p:defaultTextStyle>
   <p:extLst>
     <p:ext uri="{EFAFB233-063F-42B5-8137-9DF3F51BA10A}">
-      <p15:sldGuideLst xmlns:p15="http://schemas.microsoft.com/office/powerpoint/2012/main" xmlns="">
+      <p15:sldGuideLst xmlns="" xmlns:p15="http://schemas.microsoft.com/office/powerpoint/2012/main">
         <p15:guide id="1" orient="horz" pos="2160">
           <p15:clr>
             <a:srgbClr val="A4A3A4"/>
@@ -5726,8 +5726,8 @@
         </p:blipFill>
         <p:spPr>
           <a:xfrm>
-            <a:off x="1192409" y="1600200"/>
-            <a:ext cx="6149581" cy="4800599"/>
+            <a:off x="1250929" y="1600200"/>
+            <a:ext cx="6032540" cy="4800599"/>
           </a:xfrm>
         </p:spPr>
       </p:pic>

</xml_diff>